<commit_message>
Update Apra 2025 Data Science Challenge Deck.pptx
</commit_message>
<xml_diff>
--- a/Apra/2025/apra_2025/Apra 2025 Data Science Challenge Deck.pptx
+++ b/Apra/2025/apra_2025/Apra 2025 Data Science Challenge Deck.pptx
@@ -273,7 +273,7 @@
       <p15:sldGuideLst xmlns:p15="http://schemas.microsoft.com/office/powerpoint/2012/main"/>
     </p:ext>
     <p:ext uri="http://customooxmlschemas.google.com/">
-      <go:slidesCustomData xmlns="" xmlns:mc="http://schemas.openxmlformats.org/markup-compatibility/2006" xmlns:mv="urn:schemas-microsoft-com:mac:vml" xmlns:c="http://schemas.openxmlformats.org/drawingml/2006/chart" xmlns:dgm="http://schemas.openxmlformats.org/drawingml/2006/diagram" xmlns:o="urn:schemas-microsoft-com:office:office" xmlns:v="urn:schemas-microsoft-com:vml" xmlns:pvml="urn:schemas-microsoft-com:office:powerpoint" xmlns:com="http://schemas.openxmlformats.org/drawingml/2006/compatibility" xmlns:p14="http://schemas.microsoft.com/office/powerpoint/2010/main" xmlns:p15="http://schemas.microsoft.com/office/powerpoint/2012/main" xmlns:ahyp="http://schemas.microsoft.com/office/drawing/2018/hyperlinkcolor" xmlns:go="http://customooxmlschemas.google.com/" r:id="rId26" roundtripDataSignature="AMtx7mj/H3JGvhuesVkbz2DIx0gkc3B0nA=="/>
+      <go:slidesCustomData xmlns:go="http://customooxmlschemas.google.com/" xmlns:ahyp="http://schemas.microsoft.com/office/drawing/2018/hyperlinkcolor" xmlns:p15="http://schemas.microsoft.com/office/powerpoint/2012/main" xmlns:p14="http://schemas.microsoft.com/office/powerpoint/2010/main" xmlns:com="http://schemas.openxmlformats.org/drawingml/2006/compatibility" xmlns:pvml="urn:schemas-microsoft-com:office:powerpoint" xmlns:v="urn:schemas-microsoft-com:vml" xmlns:o="urn:schemas-microsoft-com:office:office" xmlns:dgm="http://schemas.openxmlformats.org/drawingml/2006/diagram" xmlns:c="http://schemas.openxmlformats.org/drawingml/2006/chart" xmlns:mv="urn:schemas-microsoft-com:mac:vml" xmlns:mc="http://schemas.openxmlformats.org/markup-compatibility/2006" xmlns="" r:id="rId26" roundtripDataSignature="AMtx7mj/H3JGvhuesVkbz2DIx0gkc3B0nA=="/>
     </p:ext>
   </p:extLst>
 </p:presentation>
@@ -4336,7 +4336,7 @@
         </p:nvSpPr>
         <p:spPr bwMode="auto">
           <a:xfrm rot="10800000">
-            <a:off x="3113645" y="1869896"/>
+            <a:off x="3288306" y="1849347"/>
             <a:ext cx="818911" cy="606359"/>
           </a:xfrm>
           <a:custGeom>
@@ -4573,7 +4573,7 @@
         </p:nvSpPr>
         <p:spPr bwMode="auto">
           <a:xfrm>
-            <a:off x="8477163" y="2630368"/>
+            <a:off x="8343599" y="2599545"/>
             <a:ext cx="786127" cy="604800"/>
           </a:xfrm>
           <a:custGeom>

</xml_diff>